<commit_message>
fix url on slides + history
</commit_message>
<xml_diff>
--- a/challenge.pptx
+++ b/challenge.pptx
@@ -227,7 +227,7 @@
           <a:p>
             <a:fld id="{16E5F246-0B7D-44DF-8C1B-EDFCA5DA626A}" type="datetimeFigureOut">
               <a:rPr lang="ru-RU" smtClean="0"/>
-              <a:t>10.05.2016</a:t>
+              <a:t>15.07.2016</a:t>
             </a:fld>
             <a:endParaRPr lang="ru-RU"/>
           </a:p>
@@ -844,7 +844,7 @@
           <a:p>
             <a:fld id="{ED7A5A9E-355E-4F5A-82F5-195339D13266}" type="datetimeFigureOut">
               <a:rPr lang="ru-RU" smtClean="0"/>
-              <a:t>10.05.2016</a:t>
+              <a:t>15.07.2016</a:t>
             </a:fld>
             <a:endParaRPr lang="ru-RU"/>
           </a:p>
@@ -1014,7 +1014,7 @@
           <a:p>
             <a:fld id="{ED7A5A9E-355E-4F5A-82F5-195339D13266}" type="datetimeFigureOut">
               <a:rPr lang="ru-RU" smtClean="0"/>
-              <a:t>10.05.2016</a:t>
+              <a:t>15.07.2016</a:t>
             </a:fld>
             <a:endParaRPr lang="ru-RU"/>
           </a:p>
@@ -1194,7 +1194,7 @@
           <a:p>
             <a:fld id="{ED7A5A9E-355E-4F5A-82F5-195339D13266}" type="datetimeFigureOut">
               <a:rPr lang="ru-RU" smtClean="0"/>
-              <a:t>10.05.2016</a:t>
+              <a:t>15.07.2016</a:t>
             </a:fld>
             <a:endParaRPr lang="ru-RU"/>
           </a:p>
@@ -1364,7 +1364,7 @@
           <a:p>
             <a:fld id="{ED7A5A9E-355E-4F5A-82F5-195339D13266}" type="datetimeFigureOut">
               <a:rPr lang="ru-RU" smtClean="0"/>
-              <a:t>10.05.2016</a:t>
+              <a:t>15.07.2016</a:t>
             </a:fld>
             <a:endParaRPr lang="ru-RU"/>
           </a:p>
@@ -1610,7 +1610,7 @@
           <a:p>
             <a:fld id="{ED7A5A9E-355E-4F5A-82F5-195339D13266}" type="datetimeFigureOut">
               <a:rPr lang="ru-RU" smtClean="0"/>
-              <a:t>10.05.2016</a:t>
+              <a:t>15.07.2016</a:t>
             </a:fld>
             <a:endParaRPr lang="ru-RU"/>
           </a:p>
@@ -1898,7 +1898,7 @@
           <a:p>
             <a:fld id="{ED7A5A9E-355E-4F5A-82F5-195339D13266}" type="datetimeFigureOut">
               <a:rPr lang="ru-RU" smtClean="0"/>
-              <a:t>10.05.2016</a:t>
+              <a:t>15.07.2016</a:t>
             </a:fld>
             <a:endParaRPr lang="ru-RU"/>
           </a:p>
@@ -2320,7 +2320,7 @@
           <a:p>
             <a:fld id="{ED7A5A9E-355E-4F5A-82F5-195339D13266}" type="datetimeFigureOut">
               <a:rPr lang="ru-RU" smtClean="0"/>
-              <a:t>10.05.2016</a:t>
+              <a:t>15.07.2016</a:t>
             </a:fld>
             <a:endParaRPr lang="ru-RU"/>
           </a:p>
@@ -2438,7 +2438,7 @@
           <a:p>
             <a:fld id="{ED7A5A9E-355E-4F5A-82F5-195339D13266}" type="datetimeFigureOut">
               <a:rPr lang="ru-RU" smtClean="0"/>
-              <a:t>10.05.2016</a:t>
+              <a:t>15.07.2016</a:t>
             </a:fld>
             <a:endParaRPr lang="ru-RU"/>
           </a:p>
@@ -2533,7 +2533,7 @@
           <a:p>
             <a:fld id="{ED7A5A9E-355E-4F5A-82F5-195339D13266}" type="datetimeFigureOut">
               <a:rPr lang="ru-RU" smtClean="0"/>
-              <a:t>10.05.2016</a:t>
+              <a:t>15.07.2016</a:t>
             </a:fld>
             <a:endParaRPr lang="ru-RU"/>
           </a:p>
@@ -2810,7 +2810,7 @@
           <a:p>
             <a:fld id="{ED7A5A9E-355E-4F5A-82F5-195339D13266}" type="datetimeFigureOut">
               <a:rPr lang="ru-RU" smtClean="0"/>
-              <a:t>10.05.2016</a:t>
+              <a:t>15.07.2016</a:t>
             </a:fld>
             <a:endParaRPr lang="ru-RU"/>
           </a:p>
@@ -3063,7 +3063,7 @@
           <a:p>
             <a:fld id="{ED7A5A9E-355E-4F5A-82F5-195339D13266}" type="datetimeFigureOut">
               <a:rPr lang="ru-RU" smtClean="0"/>
-              <a:t>10.05.2016</a:t>
+              <a:t>15.07.2016</a:t>
             </a:fld>
             <a:endParaRPr lang="ru-RU"/>
           </a:p>
@@ -3276,7 +3276,7 @@
           <a:p>
             <a:fld id="{ED7A5A9E-355E-4F5A-82F5-195339D13266}" type="datetimeFigureOut">
               <a:rPr lang="ru-RU" smtClean="0"/>
-              <a:t>10.05.2016</a:t>
+              <a:t>15.07.2016</a:t>
             </a:fld>
             <a:endParaRPr lang="ru-RU"/>
           </a:p>
@@ -3685,7 +3685,7 @@
         <p:spPr>
           <a:xfrm>
             <a:off x="395536" y="3588124"/>
-            <a:ext cx="8595815" cy="523220"/>
+            <a:ext cx="8149347" cy="523220"/>
           </a:xfrm>
           <a:prstGeom prst="rect">
             <a:avLst/>
@@ -3707,7 +3707,7 @@
               <a:rPr lang="en-US" sz="2800" dirty="0" smtClean="0">
                 <a:hlinkClick r:id="rId3"/>
               </a:rPr>
-              <a:t>github.com/kontur-intern-2016/testing-challenge</a:t>
+              <a:t>github.com/kontur-csharper/testing-challenge</a:t>
             </a:r>
             <a:r>
               <a:rPr lang="en-US" sz="2800" dirty="0" smtClean="0"/>
@@ -4624,11 +4624,7 @@
             </a:pPr>
             <a:r>
               <a:rPr lang="ru-RU" dirty="0" smtClean="0"/>
-              <a:t>Про взаимодействие разных пунктов спецификации подумать трудно </a:t>
-            </a:r>
-            <a:r>
-              <a:rPr lang="ru-RU" dirty="0" smtClean="0"/>
-              <a:t>(</a:t>
+              <a:t>Про взаимодействие разных пунктов спецификации подумать трудно (</a:t>
             </a:r>
             <a:r>
               <a:rPr lang="en-US" dirty="0" smtClean="0"/>
@@ -4638,7 +4634,6 @@
               <a:rPr lang="ru-RU" dirty="0" smtClean="0"/>
               <a:t>)</a:t>
             </a:r>
-            <a:endParaRPr lang="ru-RU" dirty="0" smtClean="0"/>
           </a:p>
           <a:p>
             <a:pPr marL="514350" indent="-514350">
@@ -4655,11 +4650,7 @@
             </a:r>
             <a:r>
               <a:rPr lang="ru-RU" dirty="0" smtClean="0"/>
-              <a:t>(</a:t>
-            </a:r>
-            <a:r>
-              <a:rPr lang="ru-RU" dirty="0" smtClean="0"/>
-              <a:t>9</a:t>
+              <a:t>(9</a:t>
             </a:r>
             <a:r>
               <a:rPr lang="en-US" dirty="0" smtClean="0"/>
@@ -4667,15 +4658,7 @@
             </a:r>
             <a:r>
               <a:rPr lang="ru-RU" dirty="0" smtClean="0"/>
-              <a:t>8</a:t>
-            </a:r>
-            <a:r>
-              <a:rPr lang="ru-RU" dirty="0" smtClean="0"/>
-              <a:t>, </a:t>
-            </a:r>
-            <a:r>
-              <a:rPr lang="ru-RU" dirty="0" smtClean="0"/>
-              <a:t>9</a:t>
+              <a:t>8, 9</a:t>
             </a:r>
             <a:r>
               <a:rPr lang="en-US" dirty="0" smtClean="0"/>
@@ -4683,11 +4666,7 @@
             </a:r>
             <a:r>
               <a:rPr lang="ru-RU" dirty="0" smtClean="0"/>
-              <a:t>9</a:t>
-            </a:r>
-            <a:r>
-              <a:rPr lang="ru-RU" dirty="0" smtClean="0"/>
-              <a:t>)</a:t>
+              <a:t>9)</a:t>
             </a:r>
           </a:p>
           <a:p>

</xml_diff>

<commit_message>
fix some incorrect implementations
</commit_message>
<xml_diff>
--- a/challenge.pptx
+++ b/challenge.pptx
@@ -6909,7 +6909,7 @@
           <a:p>
             <a:fld id="{CE3BC3F9-9C5B-4717-9F59-36DC790402FE}" type="datetimeFigureOut">
               <a:rPr lang="ru-RU" smtClean="0"/>
-              <a:t>28.09.2016</a:t>
+              <a:t>01.10.2016</a:t>
             </a:fld>
             <a:endParaRPr lang="ru-RU"/>
           </a:p>
@@ -7074,7 +7074,7 @@
           <a:p>
             <a:fld id="{BBBAA9EB-8042-420D-843C-EBFC35DD9FFD}" type="datetimeFigureOut">
               <a:rPr lang="ru-RU" smtClean="0"/>
-              <a:t>28.09.2016</a:t>
+              <a:t>01.10.2016</a:t>
             </a:fld>
             <a:endParaRPr lang="ru-RU"/>
           </a:p>
@@ -8917,7 +8917,7 @@
           <a:p>
             <a:fld id="{ED7A5A9E-355E-4F5A-82F5-195339D13266}" type="datetimeFigureOut">
               <a:rPr lang="ru-RU" smtClean="0"/>
-              <a:t>28.09.2016</a:t>
+              <a:t>01.10.2016</a:t>
             </a:fld>
             <a:endParaRPr lang="ru-RU"/>
           </a:p>
@@ -11992,6 +11992,13 @@
   <p:clrMapOvr>
     <a:masterClrMapping/>
   </p:clrMapOvr>
+  <p:timing>
+    <p:tnLst>
+      <p:par>
+        <p:cTn id="1" dur="indefinite" restart="never" nodeType="tmRoot"/>
+      </p:par>
+    </p:tnLst>
+  </p:timing>
 </p:sld>
 </file>
 
@@ -12045,7 +12052,18 @@
               <a:t>→ Import → </a:t>
             </a:r>
             <a:r>
-              <a:rPr lang="en-US" dirty="0" smtClean="0"/>
+              <a:rPr lang="ru-RU" smtClean="0"/>
+              <a:t/>
+            </a:r>
+            <a:br>
+              <a:rPr lang="ru-RU" smtClean="0"/>
+            </a:br>
+            <a:r>
+              <a:rPr lang="ru-RU" smtClean="0"/>
+              <a:t>→ </a:t>
+            </a:r>
+            <a:r>
+              <a:rPr lang="en-US" smtClean="0"/>
               <a:t>tests-</a:t>
             </a:r>
             <a:r>
@@ -12885,11 +12903,7 @@
             </a:pPr>
             <a:r>
               <a:rPr lang="ru-RU" smtClean="0"/>
-              <a:t>Тесты </a:t>
-            </a:r>
-            <a:r>
-              <a:rPr lang="ru-RU" smtClean="0"/>
-              <a:t>по </a:t>
+              <a:t>Тесты по </a:t>
             </a:r>
             <a:r>
               <a:rPr lang="ru-RU" dirty="0" smtClean="0"/>
@@ -14336,61 +14350,6 @@
 </file>
 
 <file path=customXml/item2.xml><?xml version="1.0" encoding="utf-8"?>
-<?mso-contentType ?>
-<FormTemplates xmlns="http://schemas.microsoft.com/sharepoint/v3/contenttype/forms">
-  <Display>DocumentLibraryForm</Display>
-  <Edit>DocumentLibraryForm</Edit>
-  <New>DocumentLibraryForm</New>
-</FormTemplates>
-</file>
-
-<file path=customXml/item3.xml><?xml version="1.0" encoding="utf-8"?>
-<?mso-contentType ?>
-<spe:Receivers xmlns:spe="http://schemas.microsoft.com/sharepoint/events">
-  <Receiver>
-    <Name>Document ID Generator</Name>
-    <Synchronization>Synchronous</Synchronization>
-    <Type>10001</Type>
-    <SequenceNumber>1000</SequenceNumber>
-    <Assembly>Microsoft.Office.DocumentManagement, Version=14.0.0.0, Culture=neutral, PublicKeyToken=71e9bce111e9429c</Assembly>
-    <Class>Microsoft.Office.DocumentManagement.Internal.DocIdHandler</Class>
-    <Data/>
-    <Filter/>
-  </Receiver>
-  <Receiver>
-    <Name>Document ID Generator</Name>
-    <Synchronization>Synchronous</Synchronization>
-    <Type>10002</Type>
-    <SequenceNumber>1001</SequenceNumber>
-    <Assembly>Microsoft.Office.DocumentManagement, Version=14.0.0.0, Culture=neutral, PublicKeyToken=71e9bce111e9429c</Assembly>
-    <Class>Microsoft.Office.DocumentManagement.Internal.DocIdHandler</Class>
-    <Data/>
-    <Filter/>
-  </Receiver>
-  <Receiver>
-    <Name>Document ID Generator</Name>
-    <Synchronization>Synchronous</Synchronization>
-    <Type>10004</Type>
-    <SequenceNumber>1002</SequenceNumber>
-    <Assembly>Microsoft.Office.DocumentManagement, Version=14.0.0.0, Culture=neutral, PublicKeyToken=71e9bce111e9429c</Assembly>
-    <Class>Microsoft.Office.DocumentManagement.Internal.DocIdHandler</Class>
-    <Data/>
-    <Filter/>
-  </Receiver>
-  <Receiver>
-    <Name>Document ID Generator</Name>
-    <Synchronization>Synchronous</Synchronization>
-    <Type>10006</Type>
-    <SequenceNumber>1003</SequenceNumber>
-    <Assembly>Microsoft.Office.DocumentManagement, Version=14.0.0.0, Culture=neutral, PublicKeyToken=71e9bce111e9429c</Assembly>
-    <Class>Microsoft.Office.DocumentManagement.Internal.DocIdHandler</Class>
-    <Data/>
-    <Filter/>
-  </Receiver>
-</spe:Receivers>
-</file>
-
-<file path=customXml/item4.xml><?xml version="1.0" encoding="utf-8"?>
 <ct:contentTypeSchema xmlns:ct="http://schemas.microsoft.com/office/2006/metadata/contentType" xmlns:ma="http://schemas.microsoft.com/office/2006/metadata/properties/metaAttributes" ct:_="" ma:_="" ma:contentTypeName="Документ" ma:contentTypeID="0x010100E346D4429ECB76409F7994AE89987FCA" ma:contentTypeVersion="0" ma:contentTypeDescription="Создание документа." ma:contentTypeScope="" ma:versionID="3cbcf180bdc4db4d624f0fe699415cfd">
   <xsd:schema xmlns:xsd="http://www.w3.org/2001/XMLSchema" xmlns:xs="http://www.w3.org/2001/XMLSchema" xmlns:p="http://schemas.microsoft.com/office/2006/metadata/properties" xmlns:ns2="0c9149cd-f996-4d9e-91c9-ce8e5945528f" targetNamespace="http://schemas.microsoft.com/office/2006/metadata/properties" ma:root="true" ma:fieldsID="8c6f0fecba2eaac0d733b3b653b3f5ff" ns2:_="">
     <xsd:import namespace="0c9149cd-f996-4d9e-91c9-ce8e5945528f"/>
@@ -14535,6 +14494,61 @@
 </ct:contentTypeSchema>
 </file>
 
+<file path=customXml/item3.xml><?xml version="1.0" encoding="utf-8"?>
+<?mso-contentType ?>
+<spe:Receivers xmlns:spe="http://schemas.microsoft.com/sharepoint/events">
+  <Receiver>
+    <Name>Document ID Generator</Name>
+    <Synchronization>Synchronous</Synchronization>
+    <Type>10001</Type>
+    <SequenceNumber>1000</SequenceNumber>
+    <Assembly>Microsoft.Office.DocumentManagement, Version=14.0.0.0, Culture=neutral, PublicKeyToken=71e9bce111e9429c</Assembly>
+    <Class>Microsoft.Office.DocumentManagement.Internal.DocIdHandler</Class>
+    <Data/>
+    <Filter/>
+  </Receiver>
+  <Receiver>
+    <Name>Document ID Generator</Name>
+    <Synchronization>Synchronous</Synchronization>
+    <Type>10002</Type>
+    <SequenceNumber>1001</SequenceNumber>
+    <Assembly>Microsoft.Office.DocumentManagement, Version=14.0.0.0, Culture=neutral, PublicKeyToken=71e9bce111e9429c</Assembly>
+    <Class>Microsoft.Office.DocumentManagement.Internal.DocIdHandler</Class>
+    <Data/>
+    <Filter/>
+  </Receiver>
+  <Receiver>
+    <Name>Document ID Generator</Name>
+    <Synchronization>Synchronous</Synchronization>
+    <Type>10004</Type>
+    <SequenceNumber>1002</SequenceNumber>
+    <Assembly>Microsoft.Office.DocumentManagement, Version=14.0.0.0, Culture=neutral, PublicKeyToken=71e9bce111e9429c</Assembly>
+    <Class>Microsoft.Office.DocumentManagement.Internal.DocIdHandler</Class>
+    <Data/>
+    <Filter/>
+  </Receiver>
+  <Receiver>
+    <Name>Document ID Generator</Name>
+    <Synchronization>Synchronous</Synchronization>
+    <Type>10006</Type>
+    <SequenceNumber>1003</SequenceNumber>
+    <Assembly>Microsoft.Office.DocumentManagement, Version=14.0.0.0, Culture=neutral, PublicKeyToken=71e9bce111e9429c</Assembly>
+    <Class>Microsoft.Office.DocumentManagement.Internal.DocIdHandler</Class>
+    <Data/>
+    <Filter/>
+  </Receiver>
+</spe:Receivers>
+</file>
+
+<file path=customXml/item4.xml><?xml version="1.0" encoding="utf-8"?>
+<?mso-contentType ?>
+<FormTemplates xmlns="http://schemas.microsoft.com/sharepoint/v3/contenttype/forms">
+  <Display>DocumentLibraryForm</Display>
+  <Edit>DocumentLibraryForm</Edit>
+  <New>DocumentLibraryForm</New>
+</FormTemplates>
+</file>
+
 <file path=customXml/itemProps1.xml><?xml version="1.0" encoding="utf-8"?>
 <ds:datastoreItem xmlns:ds="http://schemas.openxmlformats.org/officeDocument/2006/customXml" ds:itemID="{45CE6859-96AE-4F55-91FD-B1143C1F920F}">
   <ds:schemaRefs>
@@ -14552,22 +14566,6 @@
 </file>
 
 <file path=customXml/itemProps2.xml><?xml version="1.0" encoding="utf-8"?>
-<ds:datastoreItem xmlns:ds="http://schemas.openxmlformats.org/officeDocument/2006/customXml" ds:itemID="{3C9FC0A9-D1C6-450E-992B-D3422A85EAB3}">
-  <ds:schemaRefs>
-    <ds:schemaRef ds:uri="http://schemas.microsoft.com/sharepoint/v3/contenttype/forms"/>
-  </ds:schemaRefs>
-</ds:datastoreItem>
-</file>
-
-<file path=customXml/itemProps3.xml><?xml version="1.0" encoding="utf-8"?>
-<ds:datastoreItem xmlns:ds="http://schemas.openxmlformats.org/officeDocument/2006/customXml" ds:itemID="{4D57F3B4-626C-48E6-A3BF-29668BFEB3E8}">
-  <ds:schemaRefs>
-    <ds:schemaRef ds:uri="http://schemas.microsoft.com/sharepoint/events"/>
-  </ds:schemaRefs>
-</ds:datastoreItem>
-</file>
-
-<file path=customXml/itemProps4.xml><?xml version="1.0" encoding="utf-8"?>
 <ds:datastoreItem xmlns:ds="http://schemas.openxmlformats.org/officeDocument/2006/customXml" ds:itemID="{392A0E88-C45E-4035-ACB1-85AF74E6A851}">
   <ds:schemaRefs>
     <ds:schemaRef ds:uri="http://schemas.microsoft.com/office/2006/metadata/contentType"/>
@@ -14583,4 +14581,20 @@
     <ds:schemaRef ds:uri="http://schemas.microsoft.com/internal/obd"/>
   </ds:schemaRefs>
 </ds:datastoreItem>
+</file>
+
+<file path=customXml/itemProps3.xml><?xml version="1.0" encoding="utf-8"?>
+<ds:datastoreItem xmlns:ds="http://schemas.openxmlformats.org/officeDocument/2006/customXml" ds:itemID="{4D57F3B4-626C-48E6-A3BF-29668BFEB3E8}">
+  <ds:schemaRefs>
+    <ds:schemaRef ds:uri="http://schemas.microsoft.com/sharepoint/events"/>
+  </ds:schemaRefs>
+</ds:datastoreItem>
+</file>
+
+<file path=customXml/itemProps4.xml><?xml version="1.0" encoding="utf-8"?>
+<ds:datastoreItem xmlns:ds="http://schemas.openxmlformats.org/officeDocument/2006/customXml" ds:itemID="{3C9FC0A9-D1C6-450E-992B-D3422A85EAB3}">
+  <ds:schemaRefs>
+    <ds:schemaRef ds:uri="http://schemas.microsoft.com/sharepoint/v3/contenttype/forms"/>
+  </ds:schemaRefs>
+</ds:datastoreItem>
 </file>
</xml_diff>